<commit_message>
fixed EnetyServer in powerpoint
</commit_message>
<xml_diff>
--- a/Event Graph Examples/Examples/Entity Server.pptx
+++ b/Event Graph Examples/Examples/Entity Server.pptx
@@ -265,7 +265,7 @@
           <a:p>
             <a:fld id="{8CC5AED5-6446-2E4E-B541-EFF589732A2D}" type="datetimeFigureOut">
               <a:rPr lang="en-US" smtClean="0"/>
-              <a:t>2/9/25</a:t>
+              <a:t>2/10/25</a:t>
             </a:fld>
             <a:endParaRPr lang="en-US"/>
           </a:p>
@@ -463,7 +463,7 @@
           <a:p>
             <a:fld id="{8CC5AED5-6446-2E4E-B541-EFF589732A2D}" type="datetimeFigureOut">
               <a:rPr lang="en-US" smtClean="0"/>
-              <a:t>2/9/25</a:t>
+              <a:t>2/10/25</a:t>
             </a:fld>
             <a:endParaRPr lang="en-US"/>
           </a:p>
@@ -671,7 +671,7 @@
           <a:p>
             <a:fld id="{8CC5AED5-6446-2E4E-B541-EFF589732A2D}" type="datetimeFigureOut">
               <a:rPr lang="en-US" smtClean="0"/>
-              <a:t>2/9/25</a:t>
+              <a:t>2/10/25</a:t>
             </a:fld>
             <a:endParaRPr lang="en-US"/>
           </a:p>
@@ -869,7 +869,7 @@
           <a:p>
             <a:fld id="{8CC5AED5-6446-2E4E-B541-EFF589732A2D}" type="datetimeFigureOut">
               <a:rPr lang="en-US" smtClean="0"/>
-              <a:t>2/9/25</a:t>
+              <a:t>2/10/25</a:t>
             </a:fld>
             <a:endParaRPr lang="en-US"/>
           </a:p>
@@ -1144,7 +1144,7 @@
           <a:p>
             <a:fld id="{8CC5AED5-6446-2E4E-B541-EFF589732A2D}" type="datetimeFigureOut">
               <a:rPr lang="en-US" smtClean="0"/>
-              <a:t>2/9/25</a:t>
+              <a:t>2/10/25</a:t>
             </a:fld>
             <a:endParaRPr lang="en-US"/>
           </a:p>
@@ -1409,7 +1409,7 @@
           <a:p>
             <a:fld id="{8CC5AED5-6446-2E4E-B541-EFF589732A2D}" type="datetimeFigureOut">
               <a:rPr lang="en-US" smtClean="0"/>
-              <a:t>2/9/25</a:t>
+              <a:t>2/10/25</a:t>
             </a:fld>
             <a:endParaRPr lang="en-US"/>
           </a:p>
@@ -1821,7 +1821,7 @@
           <a:p>
             <a:fld id="{8CC5AED5-6446-2E4E-B541-EFF589732A2D}" type="datetimeFigureOut">
               <a:rPr lang="en-US" smtClean="0"/>
-              <a:t>2/9/25</a:t>
+              <a:t>2/10/25</a:t>
             </a:fld>
             <a:endParaRPr lang="en-US"/>
           </a:p>
@@ -1962,7 +1962,7 @@
           <a:p>
             <a:fld id="{8CC5AED5-6446-2E4E-B541-EFF589732A2D}" type="datetimeFigureOut">
               <a:rPr lang="en-US" smtClean="0"/>
-              <a:t>2/9/25</a:t>
+              <a:t>2/10/25</a:t>
             </a:fld>
             <a:endParaRPr lang="en-US"/>
           </a:p>
@@ -2075,7 +2075,7 @@
           <a:p>
             <a:fld id="{8CC5AED5-6446-2E4E-B541-EFF589732A2D}" type="datetimeFigureOut">
               <a:rPr lang="en-US" smtClean="0"/>
-              <a:t>2/9/25</a:t>
+              <a:t>2/10/25</a:t>
             </a:fld>
             <a:endParaRPr lang="en-US"/>
           </a:p>
@@ -2386,7 +2386,7 @@
           <a:p>
             <a:fld id="{8CC5AED5-6446-2E4E-B541-EFF589732A2D}" type="datetimeFigureOut">
               <a:rPr lang="en-US" smtClean="0"/>
-              <a:t>2/9/25</a:t>
+              <a:t>2/10/25</a:t>
             </a:fld>
             <a:endParaRPr lang="en-US"/>
           </a:p>
@@ -2674,7 +2674,7 @@
           <a:p>
             <a:fld id="{8CC5AED5-6446-2E4E-B541-EFF589732A2D}" type="datetimeFigureOut">
               <a:rPr lang="en-US" smtClean="0"/>
-              <a:t>2/9/25</a:t>
+              <a:t>2/10/25</a:t>
             </a:fld>
             <a:endParaRPr lang="en-US"/>
           </a:p>
@@ -2915,7 +2915,7 @@
           <a:p>
             <a:fld id="{8CC5AED5-6446-2E4E-B541-EFF589732A2D}" type="datetimeFigureOut">
               <a:rPr lang="en-US" smtClean="0"/>
-              <a:t>2/9/25</a:t>
+              <a:t>2/10/25</a:t>
             </a:fld>
             <a:endParaRPr lang="en-US"/>
           </a:p>
@@ -3955,6 +3955,48 @@
           </a:ln>
         </p:spPr>
       </p:pic>
+      <p:sp>
+        <p:nvSpPr>
+          <p:cNvPr id="3" name="TextBox 2">
+            <a:extLst>
+              <a:ext uri="{FF2B5EF4-FFF2-40B4-BE49-F238E27FC236}">
+                <a16:creationId xmlns:a16="http://schemas.microsoft.com/office/drawing/2014/main" id="{922C6D07-D5AC-3BD5-8C49-10D9079131C0}"/>
+              </a:ext>
+            </a:extLst>
+          </p:cNvPr>
+          <p:cNvSpPr txBox="1"/>
+          <p:nvPr/>
+        </p:nvSpPr>
+        <p:spPr>
+          <a:xfrm>
+            <a:off x="7924800" y="2633396"/>
+            <a:ext cx="306494" cy="369332"/>
+          </a:xfrm>
+          <a:prstGeom prst="rect">
+            <a:avLst/>
+          </a:prstGeom>
+          <a:solidFill>
+            <a:schemeClr val="bg1"/>
+          </a:solidFill>
+          <a:ln>
+            <a:solidFill>
+              <a:schemeClr val="accent1"/>
+            </a:solidFill>
+          </a:ln>
+        </p:spPr>
+        <p:txBody>
+          <a:bodyPr wrap="none" rtlCol="0">
+            <a:spAutoFit/>
+          </a:bodyPr>
+          <a:lstStyle/>
+          <a:p>
+            <a:r>
+              <a:rPr lang="en-US" dirty="0"/>
+              <a:t>e</a:t>
+            </a:r>
+          </a:p>
+        </p:txBody>
+      </p:sp>
     </p:spTree>
     <p:extLst>
       <p:ext uri="{BB962C8B-B14F-4D97-AF65-F5344CB8AC3E}">

</xml_diff>